<commit_message>
refactor: add page numbers
</commit_message>
<xml_diff>
--- a/kotlinb_vs_java_ebook.pptx
+++ b/kotlinb_vs_java_ebook.pptx
@@ -5356,8 +5356,26 @@
                     </a:schemeClr>
                   </a:solidFill>
                 </a:rPr>
-                <a:t>Página 1/100</a:t>
+                <a:t>Página </a:t>
               </a:r>
+              <a:fld id="{D89D41E7-B45B-497E-BD56-224F4BA37E0F}" type="slidenum">
+                <a:rPr lang="pt-BR" sz="1000" smtClean="0">
+                  <a:solidFill>
+                    <a:schemeClr val="tx1">
+                      <a:alpha val="50000"/>
+                    </a:schemeClr>
+                  </a:solidFill>
+                </a:rPr>
+                <a:pPr algn="ctr"/>
+                <a:t>10</a:t>
+              </a:fld>
+              <a:endParaRPr lang="pt-BR" sz="1000" dirty="0">
+                <a:solidFill>
+                  <a:schemeClr val="tx1">
+                    <a:alpha val="50000"/>
+                  </a:schemeClr>
+                </a:solidFill>
+              </a:endParaRPr>
             </a:p>
           </p:txBody>
         </p:sp>
@@ -6822,8 +6840,26 @@
                     </a:schemeClr>
                   </a:solidFill>
                 </a:rPr>
-                <a:t>Página 1/100</a:t>
+                <a:t>Página </a:t>
               </a:r>
+              <a:fld id="{D89D41E7-B45B-497E-BD56-224F4BA37E0F}" type="slidenum">
+                <a:rPr lang="pt-BR" sz="1000" smtClean="0">
+                  <a:solidFill>
+                    <a:schemeClr val="tx1">
+                      <a:alpha val="50000"/>
+                    </a:schemeClr>
+                  </a:solidFill>
+                </a:rPr>
+                <a:pPr algn="ctr"/>
+                <a:t>11</a:t>
+              </a:fld>
+              <a:endParaRPr lang="pt-BR" sz="1000" dirty="0">
+                <a:solidFill>
+                  <a:schemeClr val="tx1">
+                    <a:alpha val="50000"/>
+                  </a:schemeClr>
+                </a:solidFill>
+              </a:endParaRPr>
             </a:p>
           </p:txBody>
         </p:sp>
@@ -9211,8 +9247,26 @@
                     </a:schemeClr>
                   </a:solidFill>
                 </a:rPr>
-                <a:t>Página 1/100</a:t>
+                <a:t>Página </a:t>
               </a:r>
+              <a:fld id="{D89D41E7-B45B-497E-BD56-224F4BA37E0F}" type="slidenum">
+                <a:rPr lang="pt-BR" sz="1000" smtClean="0">
+                  <a:solidFill>
+                    <a:schemeClr val="tx1">
+                      <a:alpha val="50000"/>
+                    </a:schemeClr>
+                  </a:solidFill>
+                </a:rPr>
+                <a:pPr algn="ctr"/>
+                <a:t>12</a:t>
+              </a:fld>
+              <a:endParaRPr lang="pt-BR" sz="1000" dirty="0">
+                <a:solidFill>
+                  <a:schemeClr val="tx1">
+                    <a:alpha val="50000"/>
+                  </a:schemeClr>
+                </a:solidFill>
+              </a:endParaRPr>
             </a:p>
           </p:txBody>
         </p:sp>
@@ -11413,8 +11467,26 @@
                     </a:schemeClr>
                   </a:solidFill>
                 </a:rPr>
-                <a:t>Página 1/100</a:t>
+                <a:t>Página </a:t>
               </a:r>
+              <a:fld id="{D89D41E7-B45B-497E-BD56-224F4BA37E0F}" type="slidenum">
+                <a:rPr lang="pt-BR" sz="1000" smtClean="0">
+                  <a:solidFill>
+                    <a:schemeClr val="tx1">
+                      <a:alpha val="50000"/>
+                    </a:schemeClr>
+                  </a:solidFill>
+                </a:rPr>
+                <a:pPr algn="ctr"/>
+                <a:t>13</a:t>
+              </a:fld>
+              <a:endParaRPr lang="pt-BR" sz="1000" dirty="0">
+                <a:solidFill>
+                  <a:schemeClr val="tx1">
+                    <a:alpha val="50000"/>
+                  </a:schemeClr>
+                </a:solidFill>
+              </a:endParaRPr>
             </a:p>
           </p:txBody>
         </p:sp>
@@ -14769,8 +14841,26 @@
                     </a:schemeClr>
                   </a:solidFill>
                 </a:rPr>
-                <a:t>Página 1/100</a:t>
+                <a:t>Página </a:t>
               </a:r>
+              <a:fld id="{D89D41E7-B45B-497E-BD56-224F4BA37E0F}" type="slidenum">
+                <a:rPr lang="pt-BR" sz="1000" smtClean="0">
+                  <a:solidFill>
+                    <a:schemeClr val="tx1">
+                      <a:alpha val="50000"/>
+                    </a:schemeClr>
+                  </a:solidFill>
+                </a:rPr>
+                <a:pPr algn="ctr"/>
+                <a:t>14</a:t>
+              </a:fld>
+              <a:endParaRPr lang="pt-BR" sz="1000" dirty="0">
+                <a:solidFill>
+                  <a:schemeClr val="tx1">
+                    <a:alpha val="50000"/>
+                  </a:schemeClr>
+                </a:solidFill>
+              </a:endParaRPr>
             </a:p>
           </p:txBody>
         </p:sp>
@@ -15460,8 +15550,26 @@
                     </a:schemeClr>
                   </a:solidFill>
                 </a:rPr>
-                <a:t>Página 1/100</a:t>
+                <a:t>Página </a:t>
               </a:r>
+              <a:fld id="{D89D41E7-B45B-497E-BD56-224F4BA37E0F}" type="slidenum">
+                <a:rPr lang="pt-BR" sz="1000" smtClean="0">
+                  <a:solidFill>
+                    <a:schemeClr val="tx1">
+                      <a:alpha val="50000"/>
+                    </a:schemeClr>
+                  </a:solidFill>
+                </a:rPr>
+                <a:pPr algn="ctr"/>
+                <a:t>2</a:t>
+              </a:fld>
+              <a:endParaRPr lang="pt-BR" sz="1000" dirty="0">
+                <a:solidFill>
+                  <a:schemeClr val="tx1">
+                    <a:alpha val="50000"/>
+                  </a:schemeClr>
+                </a:solidFill>
+              </a:endParaRPr>
             </a:p>
           </p:txBody>
         </p:sp>
@@ -16197,8 +16305,26 @@
                     </a:schemeClr>
                   </a:solidFill>
                 </a:rPr>
-                <a:t>Página 1/100</a:t>
+                <a:t>Página </a:t>
               </a:r>
+              <a:fld id="{D89D41E7-B45B-497E-BD56-224F4BA37E0F}" type="slidenum">
+                <a:rPr lang="pt-BR" sz="1000" smtClean="0">
+                  <a:solidFill>
+                    <a:schemeClr val="tx1">
+                      <a:alpha val="50000"/>
+                    </a:schemeClr>
+                  </a:solidFill>
+                </a:rPr>
+                <a:pPr algn="ctr"/>
+                <a:t>3</a:t>
+              </a:fld>
+              <a:endParaRPr lang="pt-BR" sz="1000" dirty="0">
+                <a:solidFill>
+                  <a:schemeClr val="tx1">
+                    <a:alpha val="50000"/>
+                  </a:schemeClr>
+                </a:solidFill>
+              </a:endParaRPr>
             </a:p>
           </p:txBody>
         </p:sp>
@@ -17172,8 +17298,26 @@
                     </a:schemeClr>
                   </a:solidFill>
                 </a:rPr>
-                <a:t>Página 1/100</a:t>
+                <a:t>Página </a:t>
               </a:r>
+              <a:fld id="{D89D41E7-B45B-497E-BD56-224F4BA37E0F}" type="slidenum">
+                <a:rPr lang="pt-BR" sz="1000" smtClean="0">
+                  <a:solidFill>
+                    <a:schemeClr val="tx1">
+                      <a:alpha val="50000"/>
+                    </a:schemeClr>
+                  </a:solidFill>
+                </a:rPr>
+                <a:pPr algn="ctr"/>
+                <a:t>4</a:t>
+              </a:fld>
+              <a:endParaRPr lang="pt-BR" sz="1000" dirty="0">
+                <a:solidFill>
+                  <a:schemeClr val="tx1">
+                    <a:alpha val="50000"/>
+                  </a:schemeClr>
+                </a:solidFill>
+              </a:endParaRPr>
             </a:p>
           </p:txBody>
         </p:sp>
@@ -18118,8 +18262,26 @@
                     </a:schemeClr>
                   </a:solidFill>
                 </a:rPr>
-                <a:t>Página 1/100</a:t>
+                <a:t>Página </a:t>
               </a:r>
+              <a:fld id="{D89D41E7-B45B-497E-BD56-224F4BA37E0F}" type="slidenum">
+                <a:rPr lang="pt-BR" sz="1000" smtClean="0">
+                  <a:solidFill>
+                    <a:schemeClr val="tx1">
+                      <a:alpha val="50000"/>
+                    </a:schemeClr>
+                  </a:solidFill>
+                </a:rPr>
+                <a:pPr algn="ctr"/>
+                <a:t>5</a:t>
+              </a:fld>
+              <a:endParaRPr lang="pt-BR" sz="1000" dirty="0">
+                <a:solidFill>
+                  <a:schemeClr val="tx1">
+                    <a:alpha val="50000"/>
+                  </a:schemeClr>
+                </a:solidFill>
+              </a:endParaRPr>
             </a:p>
           </p:txBody>
         </p:sp>
@@ -19749,8 +19911,25 @@
                     </a:schemeClr>
                   </a:solidFill>
                 </a:rPr>
-                <a:t>Página 1/100</a:t>
+                <a:t>Página </a:t>
               </a:r>
+              <a:fld id="{D89D41E7-B45B-497E-BD56-224F4BA37E0F}" type="slidenum">
+                <a:rPr lang="pt-BR" sz="1000" smtClean="0">
+                  <a:solidFill>
+                    <a:schemeClr val="tx1">
+                      <a:alpha val="50000"/>
+                    </a:schemeClr>
+                  </a:solidFill>
+                </a:rPr>
+                <a:t>6</a:t>
+              </a:fld>
+              <a:endParaRPr lang="pt-BR" sz="1000" dirty="0">
+                <a:solidFill>
+                  <a:schemeClr val="tx1">
+                    <a:alpha val="50000"/>
+                  </a:schemeClr>
+                </a:solidFill>
+              </a:endParaRPr>
             </a:p>
           </p:txBody>
         </p:sp>
@@ -21375,8 +21554,26 @@
                     </a:schemeClr>
                   </a:solidFill>
                 </a:rPr>
-                <a:t>Página 1/100</a:t>
+                <a:t>Página </a:t>
               </a:r>
+              <a:fld id="{D89D41E7-B45B-497E-BD56-224F4BA37E0F}" type="slidenum">
+                <a:rPr lang="pt-BR" sz="1000" smtClean="0">
+                  <a:solidFill>
+                    <a:schemeClr val="tx1">
+                      <a:alpha val="50000"/>
+                    </a:schemeClr>
+                  </a:solidFill>
+                </a:rPr>
+                <a:pPr algn="ctr"/>
+                <a:t>7</a:t>
+              </a:fld>
+              <a:endParaRPr lang="pt-BR" sz="1000" dirty="0">
+                <a:solidFill>
+                  <a:schemeClr val="tx1">
+                    <a:alpha val="50000"/>
+                  </a:schemeClr>
+                </a:solidFill>
+              </a:endParaRPr>
             </a:p>
           </p:txBody>
         </p:sp>
@@ -23800,8 +23997,26 @@
                     </a:schemeClr>
                   </a:solidFill>
                 </a:rPr>
-                <a:t>Página 1/100</a:t>
+                <a:t>Página </a:t>
               </a:r>
+              <a:fld id="{D89D41E7-B45B-497E-BD56-224F4BA37E0F}" type="slidenum">
+                <a:rPr lang="pt-BR" sz="1000" smtClean="0">
+                  <a:solidFill>
+                    <a:schemeClr val="tx1">
+                      <a:alpha val="50000"/>
+                    </a:schemeClr>
+                  </a:solidFill>
+                </a:rPr>
+                <a:pPr algn="ctr"/>
+                <a:t>8</a:t>
+              </a:fld>
+              <a:endParaRPr lang="pt-BR" sz="1000" dirty="0">
+                <a:solidFill>
+                  <a:schemeClr val="tx1">
+                    <a:alpha val="50000"/>
+                  </a:schemeClr>
+                </a:solidFill>
+              </a:endParaRPr>
             </a:p>
           </p:txBody>
         </p:sp>
@@ -25928,8 +26143,26 @@
                     </a:schemeClr>
                   </a:solidFill>
                 </a:rPr>
-                <a:t>Página 1/100</a:t>
+                <a:t>Página </a:t>
               </a:r>
+              <a:fld id="{D89D41E7-B45B-497E-BD56-224F4BA37E0F}" type="slidenum">
+                <a:rPr lang="pt-BR" sz="1000" smtClean="0">
+                  <a:solidFill>
+                    <a:schemeClr val="tx1">
+                      <a:alpha val="50000"/>
+                    </a:schemeClr>
+                  </a:solidFill>
+                </a:rPr>
+                <a:pPr algn="ctr"/>
+                <a:t>9</a:t>
+              </a:fld>
+              <a:endParaRPr lang="pt-BR" sz="1000" dirty="0">
+                <a:solidFill>
+                  <a:schemeClr val="tx1">
+                    <a:alpha val="50000"/>
+                  </a:schemeClr>
+                </a:solidFill>
+              </a:endParaRPr>
             </a:p>
           </p:txBody>
         </p:sp>

</xml_diff>

<commit_message>
refactor: add folder description
</commit_message>
<xml_diff>
--- a/kotlinb_vs_java_ebook.pptx
+++ b/kotlinb_vs_java_ebook.pptx
@@ -4968,6 +4968,65 @@
           </a:p>
         </p:txBody>
       </p:sp>
+      <p:sp>
+        <p:nvSpPr>
+          <p:cNvPr id="2" name="corpo">
+            <a:extLst>
+              <a:ext uri="{FF2B5EF4-FFF2-40B4-BE49-F238E27FC236}">
+                <a16:creationId xmlns:a16="http://schemas.microsoft.com/office/drawing/2014/main" id="{4B4E1A2B-2420-DDCE-857C-8FD817447901}"/>
+              </a:ext>
+            </a:extLst>
+          </p:cNvPr>
+          <p:cNvSpPr txBox="1"/>
+          <p:nvPr/>
+        </p:nvSpPr>
+        <p:spPr>
+          <a:xfrm>
+            <a:off x="236100" y="7375275"/>
+            <a:ext cx="6444203" cy="523220"/>
+          </a:xfrm>
+          <a:prstGeom prst="rect">
+            <a:avLst/>
+          </a:prstGeom>
+          <a:noFill/>
+        </p:spPr>
+        <p:txBody>
+          <a:bodyPr wrap="square" rtlCol="0">
+            <a:spAutoFit/>
+          </a:bodyPr>
+          <a:lstStyle/>
+          <a:p>
+            <a:pPr algn="ctr"/>
+            <a:r>
+              <a:rPr lang="pt-BR" sz="1400" i="1" dirty="0">
+                <a:solidFill>
+                  <a:schemeClr val="bg1">
+                    <a:lumMod val="95000"/>
+                  </a:schemeClr>
+                </a:solidFill>
+              </a:rPr>
+              <a:t>Comparação entre os códigos e a estrutura de um projeto de API  REST utilizando Spring com Kotlin e Java</a:t>
+            </a:r>
+            <a:r>
+              <a:rPr lang="pt-BR" sz="1400" dirty="0">
+                <a:solidFill>
+                  <a:schemeClr val="bg1">
+                    <a:lumMod val="95000"/>
+                  </a:schemeClr>
+                </a:solidFill>
+              </a:rPr>
+              <a:t>.</a:t>
+            </a:r>
+            <a:endParaRPr lang="pt-BR" sz="1600" dirty="0">
+              <a:solidFill>
+                <a:schemeClr val="bg1">
+                  <a:lumMod val="95000"/>
+                </a:schemeClr>
+              </a:solidFill>
+            </a:endParaRPr>
+          </a:p>
+        </p:txBody>
+      </p:sp>
     </p:spTree>
     <p:extLst>
       <p:ext uri="{BB962C8B-B14F-4D97-AF65-F5344CB8AC3E}">

</xml_diff>